<commit_message>
Aarch virtualization documents added
</commit_message>
<xml_diff>
--- a/Documents/RFSoC_Design_V1_1.pptx
+++ b/Documents/RFSoC_Design_V1_1.pptx
@@ -282,7 +282,7 @@
           <a:p>
             <a:fld id="{4BCFB9E3-1A25-40D8-A1F2-1B6E2C7DEF49}" type="datetimeFigureOut">
               <a:rPr lang="ko-KR" altLang="en-US" smtClean="0"/>
-              <a:t>2023-07-20</a:t>
+              <a:t>2023-07-21</a:t>
             </a:fld>
             <a:endParaRPr lang="ko-KR" altLang="en-US"/>
           </a:p>
@@ -480,7 +480,7 @@
           <a:p>
             <a:fld id="{4BCFB9E3-1A25-40D8-A1F2-1B6E2C7DEF49}" type="datetimeFigureOut">
               <a:rPr lang="ko-KR" altLang="en-US" smtClean="0"/>
-              <a:t>2023-07-20</a:t>
+              <a:t>2023-07-21</a:t>
             </a:fld>
             <a:endParaRPr lang="ko-KR" altLang="en-US"/>
           </a:p>
@@ -688,7 +688,7 @@
           <a:p>
             <a:fld id="{4BCFB9E3-1A25-40D8-A1F2-1B6E2C7DEF49}" type="datetimeFigureOut">
               <a:rPr lang="ko-KR" altLang="en-US" smtClean="0"/>
-              <a:t>2023-07-20</a:t>
+              <a:t>2023-07-21</a:t>
             </a:fld>
             <a:endParaRPr lang="ko-KR" altLang="en-US"/>
           </a:p>
@@ -886,7 +886,7 @@
           <a:p>
             <a:fld id="{4BCFB9E3-1A25-40D8-A1F2-1B6E2C7DEF49}" type="datetimeFigureOut">
               <a:rPr lang="ko-KR" altLang="en-US" smtClean="0"/>
-              <a:t>2023-07-20</a:t>
+              <a:t>2023-07-21</a:t>
             </a:fld>
             <a:endParaRPr lang="ko-KR" altLang="en-US"/>
           </a:p>
@@ -1161,7 +1161,7 @@
           <a:p>
             <a:fld id="{4BCFB9E3-1A25-40D8-A1F2-1B6E2C7DEF49}" type="datetimeFigureOut">
               <a:rPr lang="ko-KR" altLang="en-US" smtClean="0"/>
-              <a:t>2023-07-20</a:t>
+              <a:t>2023-07-21</a:t>
             </a:fld>
             <a:endParaRPr lang="ko-KR" altLang="en-US"/>
           </a:p>
@@ -1426,7 +1426,7 @@
           <a:p>
             <a:fld id="{4BCFB9E3-1A25-40D8-A1F2-1B6E2C7DEF49}" type="datetimeFigureOut">
               <a:rPr lang="ko-KR" altLang="en-US" smtClean="0"/>
-              <a:t>2023-07-20</a:t>
+              <a:t>2023-07-21</a:t>
             </a:fld>
             <a:endParaRPr lang="ko-KR" altLang="en-US"/>
           </a:p>
@@ -1838,7 +1838,7 @@
           <a:p>
             <a:fld id="{4BCFB9E3-1A25-40D8-A1F2-1B6E2C7DEF49}" type="datetimeFigureOut">
               <a:rPr lang="ko-KR" altLang="en-US" smtClean="0"/>
-              <a:t>2023-07-20</a:t>
+              <a:t>2023-07-21</a:t>
             </a:fld>
             <a:endParaRPr lang="ko-KR" altLang="en-US"/>
           </a:p>
@@ -1979,7 +1979,7 @@
           <a:p>
             <a:fld id="{4BCFB9E3-1A25-40D8-A1F2-1B6E2C7DEF49}" type="datetimeFigureOut">
               <a:rPr lang="ko-KR" altLang="en-US" smtClean="0"/>
-              <a:t>2023-07-20</a:t>
+              <a:t>2023-07-21</a:t>
             </a:fld>
             <a:endParaRPr lang="ko-KR" altLang="en-US"/>
           </a:p>
@@ -2092,7 +2092,7 @@
           <a:p>
             <a:fld id="{4BCFB9E3-1A25-40D8-A1F2-1B6E2C7DEF49}" type="datetimeFigureOut">
               <a:rPr lang="ko-KR" altLang="en-US" smtClean="0"/>
-              <a:t>2023-07-20</a:t>
+              <a:t>2023-07-21</a:t>
             </a:fld>
             <a:endParaRPr lang="ko-KR" altLang="en-US"/>
           </a:p>
@@ -2403,7 +2403,7 @@
           <a:p>
             <a:fld id="{4BCFB9E3-1A25-40D8-A1F2-1B6E2C7DEF49}" type="datetimeFigureOut">
               <a:rPr lang="ko-KR" altLang="en-US" smtClean="0"/>
-              <a:t>2023-07-20</a:t>
+              <a:t>2023-07-21</a:t>
             </a:fld>
             <a:endParaRPr lang="ko-KR" altLang="en-US"/>
           </a:p>
@@ -2691,7 +2691,7 @@
           <a:p>
             <a:fld id="{4BCFB9E3-1A25-40D8-A1F2-1B6E2C7DEF49}" type="datetimeFigureOut">
               <a:rPr lang="ko-KR" altLang="en-US" smtClean="0"/>
-              <a:t>2023-07-20</a:t>
+              <a:t>2023-07-21</a:t>
             </a:fld>
             <a:endParaRPr lang="ko-KR" altLang="en-US"/>
           </a:p>
@@ -2932,7 +2932,7 @@
           <a:p>
             <a:fld id="{4BCFB9E3-1A25-40D8-A1F2-1B6E2C7DEF49}" type="datetimeFigureOut">
               <a:rPr lang="ko-KR" altLang="en-US" smtClean="0"/>
-              <a:t>2023-07-20</a:t>
+              <a:t>2023-07-21</a:t>
             </a:fld>
             <a:endParaRPr lang="ko-KR" altLang="en-US"/>
           </a:p>
@@ -40289,7 +40289,7 @@
         </p:nvSpPr>
         <p:spPr>
           <a:xfrm>
-            <a:off x="10267573" y="2540000"/>
+            <a:off x="10267573" y="2254774"/>
             <a:ext cx="1061156" cy="3860812"/>
           </a:xfrm>
           <a:prstGeom prst="rect">
@@ -40344,7 +40344,7 @@
         </p:nvGrpSpPr>
         <p:grpSpPr>
           <a:xfrm>
-            <a:off x="5204178" y="2551289"/>
+            <a:off x="5204178" y="2266063"/>
             <a:ext cx="1594555" cy="877711"/>
             <a:chOff x="4871156" y="2551289"/>
             <a:chExt cx="3149600" cy="877711"/>
@@ -40475,7 +40475,7 @@
         </p:nvGrpSpPr>
         <p:grpSpPr>
           <a:xfrm>
-            <a:off x="1789290" y="592668"/>
+            <a:off x="1789290" y="307442"/>
             <a:ext cx="1320800" cy="1546577"/>
             <a:chOff x="1529645" y="592668"/>
             <a:chExt cx="1320800" cy="1546577"/>
@@ -40744,7 +40744,7 @@
         </p:nvSpPr>
         <p:spPr>
           <a:xfrm>
-            <a:off x="1789290" y="2530126"/>
+            <a:off x="1789290" y="2244900"/>
             <a:ext cx="1320800" cy="1546578"/>
           </a:xfrm>
           <a:prstGeom prst="rect">
@@ -40799,7 +40799,7 @@
         </p:nvSpPr>
         <p:spPr>
           <a:xfrm>
-            <a:off x="7185047" y="2312749"/>
+            <a:off x="7185047" y="2027523"/>
             <a:ext cx="1320800" cy="172150"/>
           </a:xfrm>
           <a:prstGeom prst="rect">
@@ -40829,7 +40829,7 @@
           <a:p>
             <a:pPr algn="ctr"/>
             <a:r>
-              <a:rPr lang="en-US" altLang="ko-KR" sz="900" dirty="0">
+              <a:rPr lang="en-US" altLang="ko-KR" sz="900">
                 <a:solidFill>
                   <a:schemeClr val="tx1"/>
                 </a:solidFill>
@@ -40858,7 +40858,7 @@
         </p:nvSpPr>
         <p:spPr>
           <a:xfrm>
-            <a:off x="197558" y="592668"/>
+            <a:off x="197558" y="307442"/>
             <a:ext cx="1320800" cy="5808144"/>
           </a:xfrm>
           <a:prstGeom prst="rect">
@@ -40913,7 +40913,7 @@
         </p:nvGrpSpPr>
         <p:grpSpPr>
           <a:xfrm>
-            <a:off x="5204178" y="3541893"/>
+            <a:off x="5204178" y="3256667"/>
             <a:ext cx="1594555" cy="877711"/>
             <a:chOff x="4871156" y="3541893"/>
             <a:chExt cx="3149600" cy="877711"/>
@@ -41048,7 +41048,7 @@
         </p:nvCxnSpPr>
         <p:spPr>
           <a:xfrm>
-            <a:off x="2449690" y="2009422"/>
+            <a:off x="2449690" y="1724196"/>
             <a:ext cx="0" cy="520704"/>
           </a:xfrm>
           <a:prstGeom prst="straightConnector1">
@@ -41088,7 +41088,7 @@
         </p:nvSpPr>
         <p:spPr>
           <a:xfrm>
-            <a:off x="4185356" y="2551289"/>
+            <a:off x="3470380" y="2266063"/>
             <a:ext cx="824089" cy="877711"/>
           </a:xfrm>
           <a:prstGeom prst="rect">
@@ -41118,7 +41118,7 @@
           <a:p>
             <a:pPr algn="ctr"/>
             <a:r>
-              <a:rPr lang="en-US" altLang="ko-KR" sz="900" dirty="0">
+              <a:rPr lang="en-US" altLang="ko-KR" sz="900">
                 <a:solidFill>
                   <a:schemeClr val="tx1"/>
                 </a:solidFill>
@@ -41143,7 +41143,7 @@
         </p:nvGrpSpPr>
         <p:grpSpPr>
           <a:xfrm>
-            <a:off x="5204178" y="4532497"/>
+            <a:off x="5204178" y="4247271"/>
             <a:ext cx="1594555" cy="877711"/>
             <a:chOff x="4871156" y="2551289"/>
             <a:chExt cx="3149600" cy="877711"/>
@@ -41193,7 +41193,7 @@
             <a:p>
               <a:pPr algn="ctr"/>
               <a:r>
-                <a:rPr lang="en-US" altLang="ko-KR" sz="900" dirty="0">
+                <a:rPr lang="en-US" altLang="ko-KR" sz="900">
                   <a:solidFill>
                     <a:schemeClr val="tx1"/>
                   </a:solidFill>
@@ -41248,7 +41248,7 @@
             <a:p>
               <a:pPr algn="ctr"/>
               <a:r>
-                <a:rPr lang="en-US" altLang="ko-KR" sz="900" dirty="0">
+                <a:rPr lang="en-US" altLang="ko-KR" sz="900">
                   <a:solidFill>
                     <a:schemeClr val="tx1"/>
                   </a:solidFill>
@@ -41274,7 +41274,7 @@
         </p:nvGrpSpPr>
         <p:grpSpPr>
           <a:xfrm>
-            <a:off x="5204178" y="5523101"/>
+            <a:off x="5204178" y="5237875"/>
             <a:ext cx="1594555" cy="877711"/>
             <a:chOff x="4871156" y="3541893"/>
             <a:chExt cx="3149600" cy="877711"/>
@@ -41324,7 +41324,7 @@
             <a:p>
               <a:pPr algn="ctr"/>
               <a:r>
-                <a:rPr lang="en-US" altLang="ko-KR" sz="900" dirty="0">
+                <a:rPr lang="en-US" altLang="ko-KR" sz="900">
                   <a:solidFill>
                     <a:schemeClr val="tx1"/>
                   </a:solidFill>
@@ -41379,7 +41379,7 @@
             <a:p>
               <a:pPr algn="ctr"/>
               <a:r>
-                <a:rPr lang="en-US" altLang="ko-KR" sz="900" dirty="0">
+                <a:rPr lang="en-US" altLang="ko-KR" sz="900">
                   <a:solidFill>
                     <a:schemeClr val="tx1"/>
                   </a:solidFill>
@@ -41408,13 +41408,13 @@
         </p:nvCxnSpPr>
         <p:spPr>
           <a:xfrm flipV="1">
-            <a:off x="3110090" y="2540000"/>
+            <a:off x="3110090" y="2254774"/>
             <a:ext cx="7688061" cy="763415"/>
           </a:xfrm>
           <a:prstGeom prst="bentConnector4">
             <a:avLst>
               <a:gd name="adj1" fmla="val 3120"/>
-              <a:gd name="adj2" fmla="val 400463"/>
+              <a:gd name="adj2" fmla="val 381782"/>
             </a:avLst>
           </a:prstGeom>
           <a:ln>
@@ -41455,13 +41455,13 @@
         </p:nvCxnSpPr>
         <p:spPr>
           <a:xfrm rot="5400000" flipH="1" flipV="1">
-            <a:off x="2774243" y="2665592"/>
-            <a:ext cx="1086559" cy="1735666"/>
+            <a:off x="2416755" y="2737854"/>
+            <a:ext cx="1086559" cy="1020690"/>
           </a:xfrm>
           <a:prstGeom prst="bentConnector4">
             <a:avLst>
               <a:gd name="adj1" fmla="val -21039"/>
-              <a:gd name="adj2" fmla="val 69024"/>
+              <a:gd name="adj2" fmla="val 82351"/>
             </a:avLst>
           </a:prstGeom>
           <a:ln>
@@ -41497,7 +41497,7 @@
         </p:nvSpPr>
         <p:spPr>
           <a:xfrm>
-            <a:off x="4185356" y="3547539"/>
+            <a:off x="3470380" y="3262313"/>
             <a:ext cx="824089" cy="877711"/>
           </a:xfrm>
           <a:prstGeom prst="rect">
@@ -41552,7 +41552,7 @@
         </p:nvSpPr>
         <p:spPr>
           <a:xfrm>
-            <a:off x="4185356" y="4526850"/>
+            <a:off x="3470380" y="4241624"/>
             <a:ext cx="824089" cy="877711"/>
           </a:xfrm>
           <a:prstGeom prst="rect">
@@ -41607,7 +41607,7 @@
         </p:nvSpPr>
         <p:spPr>
           <a:xfrm>
-            <a:off x="4185356" y="5523100"/>
+            <a:off x="3470380" y="5237874"/>
             <a:ext cx="824089" cy="877711"/>
           </a:xfrm>
           <a:prstGeom prst="rect">
@@ -41666,13 +41666,13 @@
         </p:nvCxnSpPr>
         <p:spPr>
           <a:xfrm rot="5400000" flipH="1" flipV="1">
-            <a:off x="3272368" y="3163717"/>
-            <a:ext cx="90309" cy="1735666"/>
+            <a:off x="2914880" y="3235979"/>
+            <a:ext cx="90309" cy="1020690"/>
           </a:xfrm>
           <a:prstGeom prst="bentConnector4">
             <a:avLst>
               <a:gd name="adj1" fmla="val -253131"/>
-              <a:gd name="adj2" fmla="val 69024"/>
+              <a:gd name="adj2" fmla="val 82351"/>
             </a:avLst>
           </a:prstGeom>
           <a:ln>
@@ -41712,8 +41712,8 @@
         </p:nvCxnSpPr>
         <p:spPr>
           <a:xfrm rot="16200000" flipH="1">
-            <a:off x="2873022" y="3653372"/>
-            <a:ext cx="889002" cy="1735666"/>
+            <a:off x="2515534" y="3725634"/>
+            <a:ext cx="889002" cy="1020690"/>
           </a:xfrm>
           <a:prstGeom prst="bentConnector2">
             <a:avLst/>
@@ -41755,8 +41755,8 @@
         </p:nvCxnSpPr>
         <p:spPr>
           <a:xfrm rot="16200000" flipH="1">
-            <a:off x="2374897" y="4151497"/>
-            <a:ext cx="1885252" cy="1735666"/>
+            <a:off x="2017409" y="4223759"/>
+            <a:ext cx="1885252" cy="1020690"/>
           </a:xfrm>
           <a:prstGeom prst="bentConnector2">
             <a:avLst/>
@@ -41794,7 +41794,7 @@
         </p:nvSpPr>
         <p:spPr>
           <a:xfrm>
-            <a:off x="7185047" y="2102325"/>
+            <a:off x="7185047" y="1817099"/>
             <a:ext cx="1320800" cy="172150"/>
           </a:xfrm>
           <a:prstGeom prst="rect">
@@ -41824,7 +41824,7 @@
           <a:p>
             <a:pPr algn="ctr"/>
             <a:r>
-              <a:rPr lang="en-US" altLang="ko-KR" sz="900" dirty="0">
+              <a:rPr lang="en-US" altLang="ko-KR" sz="900">
                 <a:solidFill>
                   <a:schemeClr val="tx1"/>
                 </a:solidFill>
@@ -41849,7 +41849,7 @@
         </p:nvGrpSpPr>
         <p:grpSpPr>
           <a:xfrm>
-            <a:off x="6905025" y="2551289"/>
+            <a:off x="6905025" y="2266063"/>
             <a:ext cx="1594555" cy="877711"/>
             <a:chOff x="8252178" y="2551289"/>
             <a:chExt cx="1594555" cy="877711"/>
@@ -42030,7 +42030,7 @@
             <a:p>
               <a:pPr algn="ctr"/>
               <a:r>
-                <a:rPr lang="en-US" altLang="ko-KR" sz="900" dirty="0">
+                <a:rPr lang="en-US" altLang="ko-KR" sz="900">
                   <a:solidFill>
                     <a:schemeClr val="tx1"/>
                   </a:solidFill>
@@ -42056,7 +42056,7 @@
         </p:nvGrpSpPr>
         <p:grpSpPr>
           <a:xfrm>
-            <a:off x="6905025" y="3547539"/>
+            <a:off x="6905025" y="3262313"/>
             <a:ext cx="1594555" cy="877711"/>
             <a:chOff x="8252178" y="3547539"/>
             <a:chExt cx="1594555" cy="877711"/>
@@ -42237,7 +42237,7 @@
             <a:p>
               <a:pPr algn="ctr"/>
               <a:r>
-                <a:rPr lang="en-US" altLang="ko-KR" sz="900" dirty="0">
+                <a:rPr lang="en-US" altLang="ko-KR" sz="900">
                   <a:solidFill>
                     <a:schemeClr val="tx1"/>
                   </a:solidFill>
@@ -42263,7 +42263,7 @@
         </p:nvGrpSpPr>
         <p:grpSpPr>
           <a:xfrm>
-            <a:off x="6905025" y="4521205"/>
+            <a:off x="6905025" y="4235979"/>
             <a:ext cx="1594555" cy="877711"/>
             <a:chOff x="8252178" y="2551289"/>
             <a:chExt cx="2525889" cy="877711"/>
@@ -42313,7 +42313,7 @@
             <a:p>
               <a:pPr algn="ctr"/>
               <a:r>
-                <a:rPr lang="en-US" altLang="ko-KR" sz="900" dirty="0">
+                <a:rPr lang="en-US" altLang="ko-KR" sz="900">
                   <a:solidFill>
                     <a:schemeClr val="tx1"/>
                   </a:solidFill>
@@ -42394,7 +42394,7 @@
         </p:nvGrpSpPr>
         <p:grpSpPr>
           <a:xfrm>
-            <a:off x="6905025" y="5523099"/>
+            <a:off x="6905025" y="5237873"/>
             <a:ext cx="1594555" cy="877711"/>
             <a:chOff x="8252178" y="2551289"/>
             <a:chExt cx="2525889" cy="877711"/>
@@ -42444,7 +42444,7 @@
             <a:p>
               <a:pPr algn="ctr"/>
               <a:r>
-                <a:rPr lang="en-US" altLang="ko-KR" sz="900" dirty="0">
+                <a:rPr lang="en-US" altLang="ko-KR" sz="900">
                   <a:solidFill>
                     <a:schemeClr val="tx1"/>
                   </a:solidFill>
@@ -42525,7 +42525,7 @@
         </p:nvGrpSpPr>
         <p:grpSpPr>
           <a:xfrm>
-            <a:off x="3495780" y="867626"/>
+            <a:off x="3495780" y="582400"/>
             <a:ext cx="1101620" cy="877711"/>
             <a:chOff x="4871156" y="2551289"/>
             <a:chExt cx="3149600" cy="877711"/>
@@ -42575,7 +42575,7 @@
             <a:p>
               <a:pPr algn="ctr"/>
               <a:r>
-                <a:rPr lang="en-US" altLang="ko-KR" sz="900" dirty="0">
+                <a:rPr lang="en-US" altLang="ko-KR" sz="900">
                   <a:solidFill>
                     <a:schemeClr val="tx1"/>
                   </a:solidFill>
@@ -42634,7 +42634,7 @@
             <a:p>
               <a:pPr algn="ctr"/>
               <a:r>
-                <a:rPr lang="en-US" altLang="ko-KR" sz="900" dirty="0">
+                <a:rPr lang="en-US" altLang="ko-KR" sz="900">
                   <a:solidFill>
                     <a:schemeClr val="tx1"/>
                   </a:solidFill>
@@ -42689,7 +42689,7 @@
             <a:p>
               <a:pPr algn="ctr"/>
               <a:r>
-                <a:rPr lang="en-US" altLang="ko-KR" sz="900" dirty="0">
+                <a:rPr lang="en-US" altLang="ko-KR" sz="900">
                   <a:solidFill>
                     <a:schemeClr val="tx1"/>
                   </a:solidFill>
@@ -42715,7 +42715,7 @@
         </p:nvSpPr>
         <p:spPr>
           <a:xfrm>
-            <a:off x="10340951" y="2784687"/>
+            <a:off x="10340951" y="2499461"/>
             <a:ext cx="914400" cy="499813"/>
           </a:xfrm>
           <a:prstGeom prst="homePlate">
@@ -42745,7 +42745,7 @@
           <a:p>
             <a:pPr algn="ctr"/>
             <a:r>
-              <a:rPr lang="en-US" altLang="ko-KR" dirty="0">
+              <a:rPr lang="en-US" altLang="ko-KR">
                 <a:solidFill>
                   <a:schemeClr val="tx1"/>
                 </a:solidFill>
@@ -42774,7 +42774,7 @@
         </p:nvSpPr>
         <p:spPr>
           <a:xfrm>
-            <a:off x="10340951" y="3730841"/>
+            <a:off x="10340951" y="3445615"/>
             <a:ext cx="914400" cy="499813"/>
           </a:xfrm>
           <a:prstGeom prst="homePlate">
@@ -42804,7 +42804,7 @@
           <a:p>
             <a:pPr algn="ctr"/>
             <a:r>
-              <a:rPr lang="en-US" altLang="ko-KR" dirty="0">
+              <a:rPr lang="en-US" altLang="ko-KR">
                 <a:solidFill>
                   <a:schemeClr val="tx1"/>
                 </a:solidFill>
@@ -42833,7 +42833,7 @@
         </p:nvSpPr>
         <p:spPr>
           <a:xfrm flipH="1">
-            <a:off x="10340951" y="4769423"/>
+            <a:off x="10340951" y="4484197"/>
             <a:ext cx="914400" cy="499813"/>
           </a:xfrm>
           <a:prstGeom prst="homePlate">
@@ -42863,7 +42863,7 @@
           <a:p>
             <a:pPr algn="ctr"/>
             <a:r>
-              <a:rPr lang="en-US" altLang="ko-KR" dirty="0">
+              <a:rPr lang="en-US" altLang="ko-KR">
                 <a:solidFill>
                   <a:schemeClr val="tx1"/>
                 </a:solidFill>
@@ -42892,7 +42892,7 @@
         </p:nvSpPr>
         <p:spPr>
           <a:xfrm flipH="1">
-            <a:off x="10340951" y="5712026"/>
+            <a:off x="10340951" y="5426800"/>
             <a:ext cx="914400" cy="499813"/>
           </a:xfrm>
           <a:prstGeom prst="homePlate">
@@ -42922,7 +42922,7 @@
           <a:p>
             <a:pPr algn="ctr"/>
             <a:r>
-              <a:rPr lang="en-US" altLang="ko-KR" dirty="0">
+              <a:rPr lang="en-US" altLang="ko-KR">
                 <a:solidFill>
                   <a:schemeClr val="tx1"/>
                 </a:solidFill>
@@ -42951,7 +42951,7 @@
         </p:nvGrpSpPr>
         <p:grpSpPr>
           <a:xfrm>
-            <a:off x="8584464" y="2551289"/>
+            <a:off x="8584464" y="2266063"/>
             <a:ext cx="780803" cy="877711"/>
             <a:chOff x="8584464" y="2551289"/>
             <a:chExt cx="780803" cy="877711"/>
@@ -43001,7 +43001,7 @@
             <a:p>
               <a:pPr algn="ctr"/>
               <a:r>
-                <a:rPr lang="en-US" altLang="ko-KR" sz="900" dirty="0" err="1">
+                <a:rPr lang="en-US" altLang="ko-KR" sz="900">
                   <a:solidFill>
                     <a:schemeClr val="tx1"/>
                   </a:solidFill>
@@ -43060,7 +43060,7 @@
             <a:p>
               <a:pPr algn="ctr"/>
               <a:r>
-                <a:rPr lang="en-US" altLang="ko-KR" sz="900" dirty="0">
+                <a:rPr lang="en-US" altLang="ko-KR" sz="900">
                   <a:solidFill>
                     <a:schemeClr val="tx1"/>
                   </a:solidFill>
@@ -43086,7 +43086,7 @@
         </p:nvGrpSpPr>
         <p:grpSpPr>
           <a:xfrm>
-            <a:off x="9401885" y="2551289"/>
+            <a:off x="9401885" y="2266063"/>
             <a:ext cx="780803" cy="877711"/>
             <a:chOff x="9401885" y="2551289"/>
             <a:chExt cx="780803" cy="877711"/>
@@ -43136,7 +43136,7 @@
             <a:p>
               <a:pPr algn="ctr"/>
               <a:r>
-                <a:rPr lang="en-US" altLang="ko-KR" sz="900" dirty="0" err="1">
+                <a:rPr lang="en-US" altLang="ko-KR" sz="900">
                   <a:solidFill>
                     <a:schemeClr val="tx1"/>
                   </a:solidFill>
@@ -43195,7 +43195,7 @@
             <a:p>
               <a:pPr algn="ctr"/>
               <a:r>
-                <a:rPr lang="en-US" altLang="ko-KR" sz="900" dirty="0">
+                <a:rPr lang="en-US" altLang="ko-KR" sz="900">
                   <a:solidFill>
                     <a:schemeClr val="tx1"/>
                   </a:solidFill>
@@ -43221,7 +43221,7 @@
         </p:nvGrpSpPr>
         <p:grpSpPr>
           <a:xfrm>
-            <a:off x="8584464" y="3547543"/>
+            <a:off x="8584464" y="3262317"/>
             <a:ext cx="780803" cy="877711"/>
             <a:chOff x="8584464" y="3547543"/>
             <a:chExt cx="780803" cy="877711"/>
@@ -43271,7 +43271,7 @@
             <a:p>
               <a:pPr algn="ctr"/>
               <a:r>
-                <a:rPr lang="en-US" altLang="ko-KR" sz="900" dirty="0" err="1">
+                <a:rPr lang="en-US" altLang="ko-KR" sz="900">
                   <a:solidFill>
                     <a:schemeClr val="tx1"/>
                   </a:solidFill>
@@ -43330,7 +43330,7 @@
             <a:p>
               <a:pPr algn="ctr"/>
               <a:r>
-                <a:rPr lang="en-US" altLang="ko-KR" sz="900" dirty="0">
+                <a:rPr lang="en-US" altLang="ko-KR" sz="900">
                   <a:solidFill>
                     <a:schemeClr val="tx1"/>
                   </a:solidFill>
@@ -43356,7 +43356,7 @@
         </p:nvGrpSpPr>
         <p:grpSpPr>
           <a:xfrm>
-            <a:off x="9401885" y="3547543"/>
+            <a:off x="9401885" y="3262317"/>
             <a:ext cx="780803" cy="877711"/>
             <a:chOff x="9401885" y="3547543"/>
             <a:chExt cx="780803" cy="877711"/>
@@ -43406,7 +43406,7 @@
             <a:p>
               <a:pPr algn="ctr"/>
               <a:r>
-                <a:rPr lang="en-US" altLang="ko-KR" sz="900" dirty="0" err="1">
+                <a:rPr lang="en-US" altLang="ko-KR" sz="900">
                   <a:solidFill>
                     <a:schemeClr val="tx1"/>
                   </a:solidFill>
@@ -43465,7 +43465,7 @@
             <a:p>
               <a:pPr algn="ctr"/>
               <a:r>
-                <a:rPr lang="en-US" altLang="ko-KR" sz="900" dirty="0">
+                <a:rPr lang="en-US" altLang="ko-KR" sz="900">
                   <a:solidFill>
                     <a:schemeClr val="tx1"/>
                   </a:solidFill>
@@ -43495,7 +43495,7 @@
         </p:nvCxnSpPr>
         <p:spPr>
           <a:xfrm flipV="1">
-            <a:off x="3110090" y="1381270"/>
+            <a:off x="3110090" y="1096044"/>
             <a:ext cx="424962" cy="1922145"/>
           </a:xfrm>
           <a:prstGeom prst="bentConnector3">
@@ -43540,7 +43540,7 @@
         </p:nvCxnSpPr>
         <p:spPr>
           <a:xfrm rot="16200000" flipH="1" flipV="1">
-            <a:off x="4977203" y="-210601"/>
+            <a:off x="4977203" y="-495827"/>
             <a:ext cx="147613" cy="2008840"/>
           </a:xfrm>
           <a:prstGeom prst="bentConnector3">
@@ -43585,7 +43585,7 @@
         </p:nvCxnSpPr>
         <p:spPr>
           <a:xfrm rot="16200000" flipH="1" flipV="1">
-            <a:off x="6359706" y="-1593104"/>
+            <a:off x="6359706" y="-1878330"/>
             <a:ext cx="147613" cy="4773845"/>
           </a:xfrm>
           <a:prstGeom prst="bentConnector3">
@@ -43626,7 +43626,7 @@
         </p:nvGrpSpPr>
         <p:grpSpPr>
           <a:xfrm>
-            <a:off x="4736396" y="720013"/>
+            <a:off x="4736396" y="434787"/>
             <a:ext cx="2638068" cy="1331551"/>
             <a:chOff x="4736396" y="720013"/>
             <a:chExt cx="2638068" cy="1331551"/>
@@ -43696,7 +43696,7 @@
               <a:p>
                 <a:pPr algn="ctr"/>
                 <a:r>
-                  <a:rPr lang="en-US" altLang="ko-KR" sz="900" dirty="0">
+                  <a:rPr lang="en-US" altLang="ko-KR" sz="900">
                     <a:solidFill>
                       <a:schemeClr val="tx1"/>
                     </a:solidFill>
@@ -43771,7 +43771,7 @@
                 <a:p>
                   <a:pPr algn="ctr"/>
                   <a:r>
-                    <a:rPr lang="en-US" altLang="ko-KR" sz="900" dirty="0">
+                    <a:rPr lang="en-US" altLang="ko-KR" sz="900">
                       <a:solidFill>
                         <a:schemeClr val="tx1"/>
                       </a:solidFill>
@@ -43902,7 +43902,7 @@
                 <a:p>
                   <a:pPr algn="ctr"/>
                   <a:r>
-                    <a:rPr lang="en-US" altLang="ko-KR" sz="900" dirty="0">
+                    <a:rPr lang="en-US" altLang="ko-KR" sz="900">
                       <a:solidFill>
                         <a:schemeClr val="tx1"/>
                       </a:solidFill>
@@ -43957,7 +43957,7 @@
                 <a:p>
                   <a:pPr algn="ctr"/>
                   <a:r>
-                    <a:rPr lang="en-US" altLang="ko-KR" sz="900" dirty="0">
+                    <a:rPr lang="en-US" altLang="ko-KR" sz="900">
                       <a:solidFill>
                         <a:schemeClr val="tx1"/>
                       </a:solidFill>
@@ -44014,7 +44014,7 @@
             <a:p>
               <a:pPr algn="ctr"/>
               <a:r>
-                <a:rPr lang="en-US" altLang="ko-KR" sz="900" dirty="0">
+                <a:rPr lang="en-US" altLang="ko-KR" sz="900">
                   <a:solidFill>
                     <a:schemeClr val="tx1"/>
                   </a:solidFill>
@@ -44040,7 +44040,7 @@
         </p:nvGrpSpPr>
         <p:grpSpPr>
           <a:xfrm>
-            <a:off x="7501401" y="720013"/>
+            <a:off x="7501401" y="434787"/>
             <a:ext cx="2638068" cy="1331551"/>
             <a:chOff x="4736396" y="720013"/>
             <a:chExt cx="2638068" cy="1331551"/>
@@ -44110,7 +44110,7 @@
               <a:p>
                 <a:pPr algn="ctr"/>
                 <a:r>
-                  <a:rPr lang="en-US" altLang="ko-KR" sz="900" dirty="0">
+                  <a:rPr lang="en-US" altLang="ko-KR" sz="900">
                     <a:solidFill>
                       <a:schemeClr val="tx1"/>
                     </a:solidFill>
@@ -44185,7 +44185,7 @@
                 <a:p>
                   <a:pPr algn="ctr"/>
                   <a:r>
-                    <a:rPr lang="en-US" altLang="ko-KR" sz="900" dirty="0">
+                    <a:rPr lang="en-US" altLang="ko-KR" sz="900">
                       <a:solidFill>
                         <a:schemeClr val="tx1"/>
                       </a:solidFill>
@@ -44316,7 +44316,7 @@
                 <a:p>
                   <a:pPr algn="ctr"/>
                   <a:r>
-                    <a:rPr lang="en-US" altLang="ko-KR" sz="900" dirty="0">
+                    <a:rPr lang="en-US" altLang="ko-KR" sz="900">
                       <a:solidFill>
                         <a:schemeClr val="tx1"/>
                       </a:solidFill>
@@ -44371,7 +44371,7 @@
                 <a:p>
                   <a:pPr algn="ctr"/>
                   <a:r>
-                    <a:rPr lang="en-US" altLang="ko-KR" sz="900" dirty="0">
+                    <a:rPr lang="en-US" altLang="ko-KR" sz="900">
                       <a:solidFill>
                         <a:schemeClr val="tx1"/>
                       </a:solidFill>
@@ -44428,7 +44428,7 @@
             <a:p>
               <a:pPr algn="ctr"/>
               <a:r>
-                <a:rPr lang="en-US" altLang="ko-KR" sz="900" dirty="0">
+                <a:rPr lang="en-US" altLang="ko-KR" sz="900">
                   <a:solidFill>
                     <a:schemeClr val="tx1"/>
                   </a:solidFill>
@@ -44458,7 +44458,7 @@
         </p:nvCxnSpPr>
         <p:spPr>
           <a:xfrm rot="16200000" flipH="1">
-            <a:off x="4621047" y="1170880"/>
+            <a:off x="4621047" y="885654"/>
             <a:ext cx="805952" cy="1954866"/>
           </a:xfrm>
           <a:prstGeom prst="bentConnector3">
@@ -44502,7 +44502,7 @@
         </p:nvCxnSpPr>
         <p:spPr>
           <a:xfrm rot="10800000">
-            <a:off x="6055430" y="2051565"/>
+            <a:off x="6055430" y="1766339"/>
             <a:ext cx="899480" cy="2952947"/>
           </a:xfrm>
           <a:prstGeom prst="bentConnector2">
@@ -44527,6 +44527,449 @@
           </a:fontRef>
         </p:style>
       </p:cxnSp>
+      <p:sp>
+        <p:nvSpPr>
+          <p:cNvPr id="96" name="직사각형 95">
+            <a:extLst>
+              <a:ext uri="{FF2B5EF4-FFF2-40B4-BE49-F238E27FC236}">
+                <a16:creationId xmlns:a16="http://schemas.microsoft.com/office/drawing/2014/main" id="{AA27F4AB-671C-4C29-BC04-310B8E547752}"/>
+              </a:ext>
+            </a:extLst>
+          </p:cNvPr>
+          <p:cNvSpPr/>
+          <p:nvPr/>
+        </p:nvSpPr>
+        <p:spPr>
+          <a:xfrm>
+            <a:off x="4359687" y="2266063"/>
+            <a:ext cx="759606" cy="3849521"/>
+          </a:xfrm>
+          <a:prstGeom prst="rect">
+            <a:avLst/>
+          </a:prstGeom>
+          <a:noFill/>
+        </p:spPr>
+        <p:style>
+          <a:lnRef idx="2">
+            <a:schemeClr val="accent1">
+              <a:shade val="50000"/>
+            </a:schemeClr>
+          </a:lnRef>
+          <a:fillRef idx="1">
+            <a:schemeClr val="accent1"/>
+          </a:fillRef>
+          <a:effectRef idx="0">
+            <a:schemeClr val="accent1"/>
+          </a:effectRef>
+          <a:fontRef idx="minor">
+            <a:schemeClr val="lt1"/>
+          </a:fontRef>
+        </p:style>
+        <p:txBody>
+          <a:bodyPr rtlCol="0" anchor="t"/>
+          <a:lstStyle/>
+          <a:p>
+            <a:pPr algn="ctr"/>
+            <a:r>
+              <a:rPr lang="en-US" altLang="ko-KR" sz="900">
+                <a:solidFill>
+                  <a:schemeClr val="tx1"/>
+                </a:solidFill>
+              </a:rPr>
+              <a:t>NOP</a:t>
+            </a:r>
+            <a:r>
+              <a:rPr lang="ko-KR" altLang="en-US" sz="900">
+                <a:solidFill>
+                  <a:schemeClr val="tx1"/>
+                </a:solidFill>
+              </a:rPr>
+              <a:t> </a:t>
+            </a:r>
+            <a:r>
+              <a:rPr lang="en-US" altLang="ko-KR" sz="900">
+                <a:solidFill>
+                  <a:schemeClr val="tx1"/>
+                </a:solidFill>
+              </a:rPr>
+              <a:t>Controller</a:t>
+            </a:r>
+            <a:endParaRPr lang="ko-KR" altLang="en-US" sz="900" dirty="0"/>
+          </a:p>
+        </p:txBody>
+      </p:sp>
+      <p:grpSp>
+        <p:nvGrpSpPr>
+          <p:cNvPr id="117" name="그룹 116">
+            <a:extLst>
+              <a:ext uri="{FF2B5EF4-FFF2-40B4-BE49-F238E27FC236}">
+                <a16:creationId xmlns:a16="http://schemas.microsoft.com/office/drawing/2014/main" id="{AF66A328-BFF0-4BFD-8AF5-827E43B8C3CC}"/>
+              </a:ext>
+            </a:extLst>
+          </p:cNvPr>
+          <p:cNvGrpSpPr/>
+          <p:nvPr/>
+        </p:nvGrpSpPr>
+        <p:grpSpPr>
+          <a:xfrm>
+            <a:off x="5204178" y="6158638"/>
+            <a:ext cx="1594555" cy="673071"/>
+            <a:chOff x="4871156" y="3541893"/>
+            <a:chExt cx="3149600" cy="877711"/>
+          </a:xfrm>
+        </p:grpSpPr>
+        <p:sp>
+          <p:nvSpPr>
+            <p:cNvPr id="118" name="직사각형 117">
+              <a:extLst>
+                <a:ext uri="{FF2B5EF4-FFF2-40B4-BE49-F238E27FC236}">
+                  <a16:creationId xmlns:a16="http://schemas.microsoft.com/office/drawing/2014/main" id="{E6A12AA6-CF93-47B6-90AD-9C727CFD4C27}"/>
+                </a:ext>
+              </a:extLst>
+            </p:cNvPr>
+            <p:cNvSpPr/>
+            <p:nvPr/>
+          </p:nvSpPr>
+          <p:spPr>
+            <a:xfrm>
+              <a:off x="4871156" y="3541893"/>
+              <a:ext cx="3149600" cy="877711"/>
+            </a:xfrm>
+            <a:prstGeom prst="rect">
+              <a:avLst/>
+            </a:prstGeom>
+            <a:noFill/>
+          </p:spPr>
+          <p:style>
+            <a:lnRef idx="2">
+              <a:schemeClr val="accent1">
+                <a:shade val="50000"/>
+              </a:schemeClr>
+            </a:lnRef>
+            <a:fillRef idx="1">
+              <a:schemeClr val="accent1"/>
+            </a:fillRef>
+            <a:effectRef idx="0">
+              <a:schemeClr val="accent1"/>
+            </a:effectRef>
+            <a:fontRef idx="minor">
+              <a:schemeClr val="lt1"/>
+            </a:fontRef>
+          </p:style>
+          <p:txBody>
+            <a:bodyPr rtlCol="0" anchor="t"/>
+            <a:lstStyle/>
+            <a:p>
+              <a:pPr algn="ctr"/>
+              <a:r>
+                <a:rPr lang="en-US" altLang="ko-KR" sz="900">
+                  <a:solidFill>
+                    <a:schemeClr val="tx1"/>
+                  </a:solidFill>
+                </a:rPr>
+                <a:t>RTI Core3</a:t>
+              </a:r>
+              <a:endParaRPr lang="ko-KR" altLang="en-US" sz="900" dirty="0"/>
+            </a:p>
+          </p:txBody>
+        </p:sp>
+        <p:sp>
+          <p:nvSpPr>
+            <p:cNvPr id="119" name="직사각형 118">
+              <a:extLst>
+                <a:ext uri="{FF2B5EF4-FFF2-40B4-BE49-F238E27FC236}">
+                  <a16:creationId xmlns:a16="http://schemas.microsoft.com/office/drawing/2014/main" id="{EB78BA1F-158B-49DD-9196-896E36C0D210}"/>
+                </a:ext>
+              </a:extLst>
+            </p:cNvPr>
+            <p:cNvSpPr/>
+            <p:nvPr/>
+          </p:nvSpPr>
+          <p:spPr>
+            <a:xfrm>
+              <a:off x="5108223" y="3801537"/>
+              <a:ext cx="2664177" cy="508000"/>
+            </a:xfrm>
+            <a:prstGeom prst="rect">
+              <a:avLst/>
+            </a:prstGeom>
+            <a:noFill/>
+          </p:spPr>
+          <p:style>
+            <a:lnRef idx="2">
+              <a:schemeClr val="accent1">
+                <a:shade val="50000"/>
+              </a:schemeClr>
+            </a:lnRef>
+            <a:fillRef idx="1">
+              <a:schemeClr val="accent1"/>
+            </a:fillRef>
+            <a:effectRef idx="0">
+              <a:schemeClr val="accent1"/>
+            </a:effectRef>
+            <a:fontRef idx="minor">
+              <a:schemeClr val="lt1"/>
+            </a:fontRef>
+          </p:style>
+          <p:txBody>
+            <a:bodyPr rtlCol="0" anchor="t"/>
+            <a:lstStyle/>
+            <a:p>
+              <a:pPr algn="ctr"/>
+              <a:r>
+                <a:rPr lang="en-US" altLang="ko-KR" sz="900">
+                  <a:solidFill>
+                    <a:schemeClr val="tx1"/>
+                  </a:solidFill>
+                </a:rPr>
+                <a:t>Data FIFO</a:t>
+              </a:r>
+              <a:endParaRPr lang="ko-KR" altLang="en-US" sz="900" dirty="0"/>
+            </a:p>
+          </p:txBody>
+        </p:sp>
+      </p:grpSp>
+      <p:sp>
+        <p:nvSpPr>
+          <p:cNvPr id="120" name="직사각형 119">
+            <a:extLst>
+              <a:ext uri="{FF2B5EF4-FFF2-40B4-BE49-F238E27FC236}">
+                <a16:creationId xmlns:a16="http://schemas.microsoft.com/office/drawing/2014/main" id="{472D858B-ADFC-4116-8C92-5F26FF7F911C}"/>
+              </a:ext>
+            </a:extLst>
+          </p:cNvPr>
+          <p:cNvSpPr/>
+          <p:nvPr/>
+        </p:nvSpPr>
+        <p:spPr>
+          <a:xfrm>
+            <a:off x="3470380" y="6158637"/>
+            <a:ext cx="824089" cy="673071"/>
+          </a:xfrm>
+          <a:prstGeom prst="rect">
+            <a:avLst/>
+          </a:prstGeom>
+          <a:noFill/>
+        </p:spPr>
+        <p:style>
+          <a:lnRef idx="2">
+            <a:schemeClr val="accent1">
+              <a:shade val="50000"/>
+            </a:schemeClr>
+          </a:lnRef>
+          <a:fillRef idx="1">
+            <a:schemeClr val="accent1"/>
+          </a:fillRef>
+          <a:effectRef idx="0">
+            <a:schemeClr val="accent1"/>
+          </a:effectRef>
+          <a:fontRef idx="minor">
+            <a:schemeClr val="lt1"/>
+          </a:fontRef>
+        </p:style>
+        <p:txBody>
+          <a:bodyPr rtlCol="0" anchor="t"/>
+          <a:lstStyle/>
+          <a:p>
+            <a:pPr algn="ctr"/>
+            <a:r>
+              <a:rPr lang="en-US" altLang="ko-KR" sz="900">
+                <a:solidFill>
+                  <a:schemeClr val="tx1"/>
+                </a:solidFill>
+              </a:rPr>
+              <a:t>AXI2FIFO</a:t>
+            </a:r>
+            <a:endParaRPr lang="ko-KR" altLang="en-US" sz="900"/>
+          </a:p>
+        </p:txBody>
+      </p:sp>
+      <p:grpSp>
+        <p:nvGrpSpPr>
+          <p:cNvPr id="121" name="그룹 120">
+            <a:extLst>
+              <a:ext uri="{FF2B5EF4-FFF2-40B4-BE49-F238E27FC236}">
+                <a16:creationId xmlns:a16="http://schemas.microsoft.com/office/drawing/2014/main" id="{874D9095-6224-4381-98D5-780758224127}"/>
+              </a:ext>
+            </a:extLst>
+          </p:cNvPr>
+          <p:cNvGrpSpPr/>
+          <p:nvPr/>
+        </p:nvGrpSpPr>
+        <p:grpSpPr>
+          <a:xfrm>
+            <a:off x="6905025" y="6158636"/>
+            <a:ext cx="1594555" cy="673071"/>
+            <a:chOff x="8252178" y="2551289"/>
+            <a:chExt cx="2525889" cy="877711"/>
+          </a:xfrm>
+        </p:grpSpPr>
+        <p:sp>
+          <p:nvSpPr>
+            <p:cNvPr id="122" name="직사각형 121">
+              <a:extLst>
+                <a:ext uri="{FF2B5EF4-FFF2-40B4-BE49-F238E27FC236}">
+                  <a16:creationId xmlns:a16="http://schemas.microsoft.com/office/drawing/2014/main" id="{38D07215-5622-4CF4-9EE7-00084AA1703E}"/>
+                </a:ext>
+              </a:extLst>
+            </p:cNvPr>
+            <p:cNvSpPr/>
+            <p:nvPr/>
+          </p:nvSpPr>
+          <p:spPr>
+            <a:xfrm>
+              <a:off x="8331200" y="2755900"/>
+              <a:ext cx="1109133" cy="557389"/>
+            </a:xfrm>
+            <a:prstGeom prst="rect">
+              <a:avLst/>
+            </a:prstGeom>
+            <a:noFill/>
+          </p:spPr>
+          <p:style>
+            <a:lnRef idx="2">
+              <a:schemeClr val="accent1">
+                <a:shade val="50000"/>
+              </a:schemeClr>
+            </a:lnRef>
+            <a:fillRef idx="1">
+              <a:schemeClr val="accent1"/>
+            </a:fillRef>
+            <a:effectRef idx="0">
+              <a:schemeClr val="accent1"/>
+            </a:effectRef>
+            <a:fontRef idx="minor">
+              <a:schemeClr val="lt1"/>
+            </a:fontRef>
+          </p:style>
+          <p:txBody>
+            <a:bodyPr rtlCol="0" anchor="t"/>
+            <a:lstStyle/>
+            <a:p>
+              <a:pPr algn="ctr"/>
+              <a:r>
+                <a:rPr lang="en-US" altLang="ko-KR" sz="900">
+                  <a:solidFill>
+                    <a:schemeClr val="tx1"/>
+                  </a:solidFill>
+                </a:rPr>
+                <a:t>GPI core</a:t>
+              </a:r>
+              <a:endParaRPr lang="ko-KR" altLang="en-US" sz="900" dirty="0"/>
+            </a:p>
+          </p:txBody>
+        </p:sp>
+        <p:sp>
+          <p:nvSpPr>
+            <p:cNvPr id="123" name="직사각형 122">
+              <a:extLst>
+                <a:ext uri="{FF2B5EF4-FFF2-40B4-BE49-F238E27FC236}">
+                  <a16:creationId xmlns:a16="http://schemas.microsoft.com/office/drawing/2014/main" id="{07B1AD1B-E432-4F90-8063-6670BFDB66C7}"/>
+                </a:ext>
+              </a:extLst>
+            </p:cNvPr>
+            <p:cNvSpPr/>
+            <p:nvPr/>
+          </p:nvSpPr>
+          <p:spPr>
+            <a:xfrm>
+              <a:off x="8252178" y="2551289"/>
+              <a:ext cx="2525889" cy="877711"/>
+            </a:xfrm>
+            <a:prstGeom prst="rect">
+              <a:avLst/>
+            </a:prstGeom>
+            <a:noFill/>
+          </p:spPr>
+          <p:style>
+            <a:lnRef idx="2">
+              <a:schemeClr val="accent1">
+                <a:shade val="50000"/>
+              </a:schemeClr>
+            </a:lnRef>
+            <a:fillRef idx="1">
+              <a:schemeClr val="accent1"/>
+            </a:fillRef>
+            <a:effectRef idx="0">
+              <a:schemeClr val="accent1"/>
+            </a:effectRef>
+            <a:fontRef idx="minor">
+              <a:schemeClr val="lt1"/>
+            </a:fontRef>
+          </p:style>
+          <p:txBody>
+            <a:bodyPr rtlCol="0" anchor="t"/>
+            <a:lstStyle/>
+            <a:p>
+              <a:pPr algn="ctr"/>
+              <a:r>
+                <a:rPr lang="en-US" altLang="ko-KR" sz="900" dirty="0" err="1">
+                  <a:solidFill>
+                    <a:schemeClr val="tx1"/>
+                  </a:solidFill>
+                </a:rPr>
+                <a:t>TTL_controller</a:t>
+              </a:r>
+              <a:endParaRPr lang="ko-KR" altLang="en-US" sz="900" dirty="0"/>
+            </a:p>
+          </p:txBody>
+        </p:sp>
+      </p:grpSp>
+      <p:sp>
+        <p:nvSpPr>
+          <p:cNvPr id="124" name="직사각형 123">
+            <a:extLst>
+              <a:ext uri="{FF2B5EF4-FFF2-40B4-BE49-F238E27FC236}">
+                <a16:creationId xmlns:a16="http://schemas.microsoft.com/office/drawing/2014/main" id="{86AA9BFB-9FA8-4AF1-8156-B20048EBA072}"/>
+              </a:ext>
+            </a:extLst>
+          </p:cNvPr>
+          <p:cNvSpPr/>
+          <p:nvPr/>
+        </p:nvSpPr>
+        <p:spPr>
+          <a:xfrm>
+            <a:off x="10267573" y="6158635"/>
+            <a:ext cx="1061156" cy="673071"/>
+          </a:xfrm>
+          <a:prstGeom prst="rect">
+            <a:avLst/>
+          </a:prstGeom>
+          <a:noFill/>
+        </p:spPr>
+        <p:style>
+          <a:lnRef idx="2">
+            <a:schemeClr val="accent1">
+              <a:shade val="50000"/>
+            </a:schemeClr>
+          </a:lnRef>
+          <a:fillRef idx="1">
+            <a:schemeClr val="accent1"/>
+          </a:fillRef>
+          <a:effectRef idx="0">
+            <a:schemeClr val="accent1"/>
+          </a:effectRef>
+          <a:fontRef idx="minor">
+            <a:schemeClr val="lt1"/>
+          </a:fontRef>
+        </p:style>
+        <p:txBody>
+          <a:bodyPr rtlCol="0" anchor="t"/>
+          <a:lstStyle/>
+          <a:p>
+            <a:pPr algn="ctr"/>
+            <a:r>
+              <a:rPr lang="en-US" altLang="ko-KR" sz="900" dirty="0" err="1">
+                <a:solidFill>
+                  <a:schemeClr val="tx1"/>
+                </a:solidFill>
+              </a:rPr>
+              <a:t>TTL_pad</a:t>
+            </a:r>
+            <a:endParaRPr lang="ko-KR" altLang="en-US" sz="900" dirty="0"/>
+          </a:p>
+        </p:txBody>
+      </p:sp>
     </p:spTree>
     <p:extLst>
       <p:ext uri="{BB962C8B-B14F-4D97-AF65-F5344CB8AC3E}">

</xml_diff>